<commit_message>
changed status bar synced geomap with bar using predict algorithm
</commit_message>
<xml_diff>
--- a/Final-Group-Presentation/Sample Final Group Presentation(Sve it as PDF).pptx
+++ b/Final-Group-Presentation/Sample Final Group Presentation(Sve it as PDF).pptx
@@ -202,7 +202,7 @@
           <a:p>
             <a:fld id="{50E52709-5ECC-8044-9942-4C9CF22CCC7F}" type="datetimeFigureOut">
               <a:rPr lang="en-US" smtClean="0"/>
-              <a:t>4/14/20</a:t>
+              <a:t>4/19/20</a:t>
             </a:fld>
             <a:endParaRPr lang="en-US"/>
           </a:p>
@@ -515,7 +515,13 @@
           <a:p>
             <a:r>
               <a:rPr lang="en-US" dirty="0"/>
-              <a:t>We used US Accidents dataset from Kaggle which has 2.9million observations and 49 features</a:t>
+              <a:t>DATA SET:</a:t>
+            </a:r>
+          </a:p>
+          <a:p>
+            <a:r>
+              <a:rPr lang="en-US" dirty="0"/>
+              <a:t>	We used US Accidents dataset from Kaggle which has 2.9million observations and 49 features</a:t>
             </a:r>
           </a:p>
           <a:p>
@@ -524,13 +530,28 @@
           <a:p>
             <a:r>
               <a:rPr lang="en-US" dirty="0"/>
-              <a:t>Our application is a Data analysis and Visualization tool to help understand the complex and large dataset from US accidents</a:t>
+              <a:t>APPLICATION:</a:t>
             </a:r>
           </a:p>
           <a:p>
             <a:r>
               <a:rPr lang="en-US" dirty="0"/>
-              <a:t>It also uses Algorithms such as Decision Trees, Random Forest, SVM etc. to help predict severity of accidents with specific arguments in our chosen parameters</a:t>
+              <a:t>	Our application is a Data analysis and Visualization tool to help understand the complex and large dataset from US accidents</a:t>
+            </a:r>
+          </a:p>
+          <a:p>
+            <a:r>
+              <a:rPr lang="en-US" dirty="0"/>
+              <a:t>	It also uses Algorithms such as Decision Trees, Random Forest, SVM etc. to help predict severity of accidents with specific arguments in our chosen parameters</a:t>
+            </a:r>
+          </a:p>
+          <a:p>
+            <a:endParaRPr lang="en-US" dirty="0"/>
+          </a:p>
+          <a:p>
+            <a:r>
+              <a:rPr lang="en-US" dirty="0"/>
+              <a:t>DEMO IN THE END:</a:t>
             </a:r>
           </a:p>
         </p:txBody>
@@ -617,7 +638,40 @@
           <a:p>
             <a:r>
               <a:rPr lang="en-US" dirty="0"/>
-              <a:t>We deleted unnecessary columns such as where the data set was gathered</a:t>
+              <a:t>Feature selection</a:t>
+            </a:r>
+          </a:p>
+          <a:p>
+            <a:r>
+              <a:rPr lang="en-US" dirty="0"/>
+              <a:t>	To reduce dimensionality</a:t>
+            </a:r>
+          </a:p>
+          <a:p>
+            <a:r>
+              <a:rPr lang="en-US" dirty="0"/>
+              <a:t>	We deleted unnecessary columns such as where the data set was gathered</a:t>
+            </a:r>
+          </a:p>
+          <a:p>
+            <a:r>
+              <a:rPr lang="en-US" dirty="0"/>
+              <a:t>	We too in features that would help in the visualization and prediction of the data set</a:t>
+            </a:r>
+          </a:p>
+          <a:p>
+            <a:endParaRPr lang="en-US" dirty="0"/>
+          </a:p>
+          <a:p>
+            <a:r>
+              <a:rPr lang="en-US" dirty="0"/>
+              <a:t>Missing data</a:t>
+            </a:r>
+          </a:p>
+          <a:p>
+            <a:r>
+              <a:rPr lang="en-US" dirty="0"/>
+              <a:t>	We decided to take the mean of the whole data set to replace missing data</a:t>
             </a:r>
           </a:p>
           <a:p>
@@ -985,6 +1039,93 @@
     <p:extLst>
       <p:ext uri="{BB962C8B-B14F-4D97-AF65-F5344CB8AC3E}">
         <p14:creationId xmlns:p14="http://schemas.microsoft.com/office/powerpoint/2010/main" val="2173695845"/>
+      </p:ext>
+    </p:extLst>
+  </p:cSld>
+  <p:clrMapOvr>
+    <a:masterClrMapping/>
+  </p:clrMapOvr>
+</p:notes>
+</file>
+
+<file path=ppt/notesSlides/notesSlide5.xml><?xml version="1.0" encoding="utf-8"?>
+<p:notes xmlns:a="http://schemas.openxmlformats.org/drawingml/2006/main" xmlns:r="http://schemas.openxmlformats.org/officeDocument/2006/relationships" xmlns:p="http://schemas.openxmlformats.org/presentationml/2006/main">
+  <p:cSld>
+    <p:spTree>
+      <p:nvGrpSpPr>
+        <p:cNvPr id="1" name=""/>
+        <p:cNvGrpSpPr/>
+        <p:nvPr/>
+      </p:nvGrpSpPr>
+      <p:grpSpPr>
+        <a:xfrm>
+          <a:off x="0" y="0"/>
+          <a:ext cx="0" cy="0"/>
+          <a:chOff x="0" y="0"/>
+          <a:chExt cx="0" cy="0"/>
+        </a:xfrm>
+      </p:grpSpPr>
+      <p:sp>
+        <p:nvSpPr>
+          <p:cNvPr id="2" name="Slide Image Placeholder 1"/>
+          <p:cNvSpPr>
+            <a:spLocks noGrp="1" noRot="1" noChangeAspect="1"/>
+          </p:cNvSpPr>
+          <p:nvPr>
+            <p:ph type="sldImg"/>
+          </p:nvPr>
+        </p:nvSpPr>
+        <p:spPr/>
+      </p:sp>
+      <p:sp>
+        <p:nvSpPr>
+          <p:cNvPr id="3" name="Notes Placeholder 2"/>
+          <p:cNvSpPr>
+            <a:spLocks noGrp="1"/>
+          </p:cNvSpPr>
+          <p:nvPr>
+            <p:ph type="body" idx="1"/>
+          </p:nvPr>
+        </p:nvSpPr>
+        <p:spPr/>
+        <p:txBody>
+          <a:bodyPr/>
+          <a:lstStyle/>
+          <a:p>
+            <a:r>
+              <a:rPr lang="en-US" dirty="0"/>
+              <a:t>Please turn up the brightness in your screens</a:t>
+            </a:r>
+          </a:p>
+        </p:txBody>
+      </p:sp>
+      <p:sp>
+        <p:nvSpPr>
+          <p:cNvPr id="4" name="Slide Number Placeholder 3"/>
+          <p:cNvSpPr>
+            <a:spLocks noGrp="1"/>
+          </p:cNvSpPr>
+          <p:nvPr>
+            <p:ph type="sldNum" sz="quarter" idx="5"/>
+          </p:nvPr>
+        </p:nvSpPr>
+        <p:spPr/>
+        <p:txBody>
+          <a:bodyPr/>
+          <a:lstStyle/>
+          <a:p>
+            <a:fld id="{9B1BCF43-D255-F944-B487-72C9A7817D59}" type="slidenum">
+              <a:rPr lang="en-US" smtClean="0"/>
+              <a:t>6</a:t>
+            </a:fld>
+            <a:endParaRPr lang="en-US"/>
+          </a:p>
+        </p:txBody>
+      </p:sp>
+    </p:spTree>
+    <p:extLst>
+      <p:ext uri="{BB962C8B-B14F-4D97-AF65-F5344CB8AC3E}">
+        <p14:creationId xmlns:p14="http://schemas.microsoft.com/office/powerpoint/2010/main" val="3435615150"/>
       </p:ext>
     </p:extLst>
   </p:cSld>
@@ -1141,7 +1282,7 @@
           <a:p>
             <a:fld id="{B9697A7F-CD11-1542-A0CB-EEE68EC1F712}" type="datetimeFigureOut">
               <a:rPr lang="en-US" smtClean="0"/>
-              <a:t>4/14/20</a:t>
+              <a:t>4/19/20</a:t>
             </a:fld>
             <a:endParaRPr lang="en-US"/>
           </a:p>
@@ -1339,7 +1480,7 @@
           <a:p>
             <a:fld id="{B9697A7F-CD11-1542-A0CB-EEE68EC1F712}" type="datetimeFigureOut">
               <a:rPr lang="en-US" smtClean="0"/>
-              <a:t>4/14/20</a:t>
+              <a:t>4/19/20</a:t>
             </a:fld>
             <a:endParaRPr lang="en-US"/>
           </a:p>
@@ -1547,7 +1688,7 @@
           <a:p>
             <a:fld id="{B9697A7F-CD11-1542-A0CB-EEE68EC1F712}" type="datetimeFigureOut">
               <a:rPr lang="en-US" smtClean="0"/>
-              <a:t>4/14/20</a:t>
+              <a:t>4/19/20</a:t>
             </a:fld>
             <a:endParaRPr lang="en-US"/>
           </a:p>
@@ -1745,7 +1886,7 @@
           <a:p>
             <a:fld id="{B9697A7F-CD11-1542-A0CB-EEE68EC1F712}" type="datetimeFigureOut">
               <a:rPr lang="en-US" smtClean="0"/>
-              <a:t>4/14/20</a:t>
+              <a:t>4/19/20</a:t>
             </a:fld>
             <a:endParaRPr lang="en-US"/>
           </a:p>
@@ -2020,7 +2161,7 @@
           <a:p>
             <a:fld id="{B9697A7F-CD11-1542-A0CB-EEE68EC1F712}" type="datetimeFigureOut">
               <a:rPr lang="en-US" smtClean="0"/>
-              <a:t>4/14/20</a:t>
+              <a:t>4/19/20</a:t>
             </a:fld>
             <a:endParaRPr lang="en-US"/>
           </a:p>
@@ -2285,7 +2426,7 @@
           <a:p>
             <a:fld id="{B9697A7F-CD11-1542-A0CB-EEE68EC1F712}" type="datetimeFigureOut">
               <a:rPr lang="en-US" smtClean="0"/>
-              <a:t>4/14/20</a:t>
+              <a:t>4/19/20</a:t>
             </a:fld>
             <a:endParaRPr lang="en-US"/>
           </a:p>
@@ -2697,7 +2838,7 @@
           <a:p>
             <a:fld id="{B9697A7F-CD11-1542-A0CB-EEE68EC1F712}" type="datetimeFigureOut">
               <a:rPr lang="en-US" smtClean="0"/>
-              <a:t>4/14/20</a:t>
+              <a:t>4/19/20</a:t>
             </a:fld>
             <a:endParaRPr lang="en-US"/>
           </a:p>
@@ -2838,7 +2979,7 @@
           <a:p>
             <a:fld id="{B9697A7F-CD11-1542-A0CB-EEE68EC1F712}" type="datetimeFigureOut">
               <a:rPr lang="en-US" smtClean="0"/>
-              <a:t>4/14/20</a:t>
+              <a:t>4/19/20</a:t>
             </a:fld>
             <a:endParaRPr lang="en-US"/>
           </a:p>
@@ -2951,7 +3092,7 @@
           <a:p>
             <a:fld id="{B9697A7F-CD11-1542-A0CB-EEE68EC1F712}" type="datetimeFigureOut">
               <a:rPr lang="en-US" smtClean="0"/>
-              <a:t>4/14/20</a:t>
+              <a:t>4/19/20</a:t>
             </a:fld>
             <a:endParaRPr lang="en-US"/>
           </a:p>
@@ -3262,7 +3403,7 @@
           <a:p>
             <a:fld id="{B9697A7F-CD11-1542-A0CB-EEE68EC1F712}" type="datetimeFigureOut">
               <a:rPr lang="en-US" smtClean="0"/>
-              <a:t>4/14/20</a:t>
+              <a:t>4/19/20</a:t>
             </a:fld>
             <a:endParaRPr lang="en-US"/>
           </a:p>
@@ -3550,7 +3691,7 @@
           <a:p>
             <a:fld id="{B9697A7F-CD11-1542-A0CB-EEE68EC1F712}" type="datetimeFigureOut">
               <a:rPr lang="en-US" smtClean="0"/>
-              <a:t>4/14/20</a:t>
+              <a:t>4/19/20</a:t>
             </a:fld>
             <a:endParaRPr lang="en-US"/>
           </a:p>
@@ -3791,7 +3932,7 @@
           <a:p>
             <a:fld id="{B9697A7F-CD11-1542-A0CB-EEE68EC1F712}" type="datetimeFigureOut">
               <a:rPr lang="en-US" smtClean="0"/>
-              <a:t>4/14/20</a:t>
+              <a:t>4/19/20</a:t>
             </a:fld>
             <a:endParaRPr lang="en-US"/>
           </a:p>
@@ -4823,7 +4964,7 @@
           <a:lstStyle/>
           <a:p>
             <a:r>
-              <a:rPr lang="en-US" sz="2000">
+              <a:rPr lang="en-US" sz="2000" dirty="0">
                 <a:solidFill>
                   <a:schemeClr val="bg1"/>
                 </a:solidFill>
@@ -4833,12 +4974,42 @@
           </a:p>
           <a:p>
             <a:r>
-              <a:rPr lang="en-US" sz="2000">
+              <a:rPr lang="en-US" sz="2000" dirty="0">
                 <a:solidFill>
                   <a:schemeClr val="bg1"/>
                 </a:solidFill>
               </a:rPr>
-              <a:t>Our application</a:t>
+              <a:t>Pre-processing and Data Analysis</a:t>
+            </a:r>
+          </a:p>
+          <a:p>
+            <a:r>
+              <a:rPr lang="en-US" sz="2000" dirty="0">
+                <a:solidFill>
+                  <a:schemeClr val="bg1"/>
+                </a:solidFill>
+              </a:rPr>
+              <a:t>Data Visualization</a:t>
+            </a:r>
+          </a:p>
+          <a:p>
+            <a:r>
+              <a:rPr lang="en-US" sz="2000" dirty="0">
+                <a:solidFill>
+                  <a:schemeClr val="bg1"/>
+                </a:solidFill>
+              </a:rPr>
+              <a:t>ML Algorithms</a:t>
+            </a:r>
+          </a:p>
+          <a:p>
+            <a:r>
+              <a:rPr lang="en-US" sz="2000" dirty="0">
+                <a:solidFill>
+                  <a:schemeClr val="bg1"/>
+                </a:solidFill>
+              </a:rPr>
+              <a:t>Demonstration</a:t>
             </a:r>
           </a:p>
         </p:txBody>
@@ -5122,11 +5293,14 @@
           </a:bodyPr>
           <a:lstStyle/>
           <a:p>
-            <a:endParaRPr lang="en-US" sz="2000">
-              <a:solidFill>
-                <a:schemeClr val="bg1"/>
-              </a:solidFill>
-            </a:endParaRPr>
+            <a:r>
+              <a:rPr lang="en-US" sz="2000" dirty="0">
+                <a:solidFill>
+                  <a:schemeClr val="bg1"/>
+                </a:solidFill>
+              </a:rPr>
+              <a:t>Feature Selection </a:t>
+            </a:r>
           </a:p>
         </p:txBody>
       </p:sp>
@@ -5927,7 +6101,7 @@
           <a:lstStyle/>
           <a:p>
             <a:r>
-              <a:rPr lang="en-US" sz="8000">
+              <a:rPr lang="en-US" sz="8000" dirty="0">
                 <a:solidFill>
                   <a:schemeClr val="bg1"/>
                 </a:solidFill>
@@ -5935,13 +6109,13 @@
               <a:t>Demo</a:t>
             </a:r>
             <a:br>
-              <a:rPr lang="en-US" sz="8000">
+              <a:rPr lang="en-US" sz="8000" dirty="0">
                 <a:solidFill>
                   <a:schemeClr val="bg1"/>
                 </a:solidFill>
               </a:rPr>
             </a:br>
-            <a:endParaRPr lang="en-US" sz="8000">
+            <a:endParaRPr lang="en-US" sz="8000" dirty="0">
               <a:solidFill>
                 <a:schemeClr val="bg1"/>
               </a:solidFill>

</xml_diff>